<commit_message>
Fixed error in powerpoint
</commit_message>
<xml_diff>
--- a/Modeling the Anharmonic Oscillator.pptx
+++ b/Modeling the Anharmonic Oscillator.pptx
@@ -110,6 +110,11 @@
       </a:defRPr>
     </a:lvl9pPr>
   </p:defaultTextStyle>
+  <p:extLst>
+    <p:ext uri="{EFAFB233-063F-42B5-8137-9DF3F51BA10A}">
+      <p15:sldGuideLst xmlns:p15="http://schemas.microsoft.com/office/powerpoint/2012/main"/>
+    </p:ext>
+  </p:extLst>
 </p:presentation>
 </file>
 
@@ -174,7 +179,7 @@
           </a:lstStyle>
           <a:p>
             <a:r>
-              <a:rPr lang="en-US" smtClean="0"/>
+              <a:rPr lang="en-US"/>
               <a:t>Click to edit Master title style</a:t>
             </a:r>
             <a:endParaRPr lang="en-US" dirty="0"/>
@@ -247,7 +252,7 @@
           </a:lstStyle>
           <a:p>
             <a:r>
-              <a:rPr lang="en-US" smtClean="0"/>
+              <a:rPr lang="en-US"/>
               <a:t>Click to edit Master subtitle style</a:t>
             </a:r>
             <a:endParaRPr lang="en-US" dirty="0"/>
@@ -281,7 +286,7 @@
           <a:p>
             <a:fld id="{B12B632E-5F21-49E3-AE67-6962FA670801}" type="datetimeFigureOut">
               <a:rPr lang="en-US" smtClean="0"/>
-              <a:t>3/8/2018</a:t>
+              <a:t>3/9/2018</a:t>
             </a:fld>
             <a:endParaRPr lang="en-US"/>
           </a:p>
@@ -433,7 +438,7 @@
           <a:lstStyle/>
           <a:p>
             <a:r>
-              <a:rPr lang="en-US" smtClean="0"/>
+              <a:rPr lang="en-US"/>
               <a:t>Click to edit Master title style</a:t>
             </a:r>
             <a:endParaRPr lang="en-US" dirty="0"/>
@@ -457,35 +462,35 @@
           <a:p>
             <a:pPr lvl="0"/>
             <a:r>
-              <a:rPr lang="en-US" smtClean="0"/>
+              <a:rPr lang="en-US"/>
               <a:t>Click to edit Master text styles</a:t>
             </a:r>
           </a:p>
           <a:p>
             <a:pPr lvl="1"/>
             <a:r>
-              <a:rPr lang="en-US" smtClean="0"/>
+              <a:rPr lang="en-US"/>
               <a:t>Second level</a:t>
             </a:r>
           </a:p>
           <a:p>
             <a:pPr lvl="2"/>
             <a:r>
-              <a:rPr lang="en-US" smtClean="0"/>
+              <a:rPr lang="en-US"/>
               <a:t>Third level</a:t>
             </a:r>
           </a:p>
           <a:p>
             <a:pPr lvl="3"/>
             <a:r>
-              <a:rPr lang="en-US" smtClean="0"/>
+              <a:rPr lang="en-US"/>
               <a:t>Fourth level</a:t>
             </a:r>
           </a:p>
           <a:p>
             <a:pPr lvl="4"/>
             <a:r>
-              <a:rPr lang="en-US" smtClean="0"/>
+              <a:rPr lang="en-US"/>
               <a:t>Fifth level</a:t>
             </a:r>
             <a:endParaRPr lang="en-US" dirty="0"/>
@@ -509,7 +514,7 @@
           <a:p>
             <a:fld id="{B12B632E-5F21-49E3-AE67-6962FA670801}" type="datetimeFigureOut">
               <a:rPr lang="en-US" smtClean="0"/>
-              <a:t>3/8/2018</a:t>
+              <a:t>3/9/2018</a:t>
             </a:fld>
             <a:endParaRPr lang="en-US"/>
           </a:p>
@@ -608,7 +613,7 @@
           <a:lstStyle/>
           <a:p>
             <a:r>
-              <a:rPr lang="en-US" smtClean="0"/>
+              <a:rPr lang="en-US"/>
               <a:t>Click to edit Master title style</a:t>
             </a:r>
             <a:endParaRPr lang="en-US" dirty="0"/>
@@ -637,35 +642,35 @@
           <a:p>
             <a:pPr lvl="0"/>
             <a:r>
-              <a:rPr lang="en-US" smtClean="0"/>
+              <a:rPr lang="en-US"/>
               <a:t>Click to edit Master text styles</a:t>
             </a:r>
           </a:p>
           <a:p>
             <a:pPr lvl="1"/>
             <a:r>
-              <a:rPr lang="en-US" smtClean="0"/>
+              <a:rPr lang="en-US"/>
               <a:t>Second level</a:t>
             </a:r>
           </a:p>
           <a:p>
             <a:pPr lvl="2"/>
             <a:r>
-              <a:rPr lang="en-US" smtClean="0"/>
+              <a:rPr lang="en-US"/>
               <a:t>Third level</a:t>
             </a:r>
           </a:p>
           <a:p>
             <a:pPr lvl="3"/>
             <a:r>
-              <a:rPr lang="en-US" smtClean="0"/>
+              <a:rPr lang="en-US"/>
               <a:t>Fourth level</a:t>
             </a:r>
           </a:p>
           <a:p>
             <a:pPr lvl="4"/>
             <a:r>
-              <a:rPr lang="en-US" smtClean="0"/>
+              <a:rPr lang="en-US"/>
               <a:t>Fifth level</a:t>
             </a:r>
             <a:endParaRPr lang="en-US" dirty="0"/>
@@ -689,7 +694,7 @@
           <a:p>
             <a:fld id="{B12B632E-5F21-49E3-AE67-6962FA670801}" type="datetimeFigureOut">
               <a:rPr lang="en-US" smtClean="0"/>
-              <a:t>3/8/2018</a:t>
+              <a:t>3/9/2018</a:t>
             </a:fld>
             <a:endParaRPr lang="en-US"/>
           </a:p>
@@ -783,7 +788,7 @@
           <a:lstStyle/>
           <a:p>
             <a:r>
-              <a:rPr lang="en-US" smtClean="0"/>
+              <a:rPr lang="en-US"/>
               <a:t>Click to edit Master title style</a:t>
             </a:r>
             <a:endParaRPr lang="en-US" dirty="0"/>
@@ -807,35 +812,35 @@
           <a:p>
             <a:pPr lvl="0"/>
             <a:r>
-              <a:rPr lang="en-US" smtClean="0"/>
+              <a:rPr lang="en-US"/>
               <a:t>Click to edit Master text styles</a:t>
             </a:r>
           </a:p>
           <a:p>
             <a:pPr lvl="1"/>
             <a:r>
-              <a:rPr lang="en-US" smtClean="0"/>
+              <a:rPr lang="en-US"/>
               <a:t>Second level</a:t>
             </a:r>
           </a:p>
           <a:p>
             <a:pPr lvl="2"/>
             <a:r>
-              <a:rPr lang="en-US" smtClean="0"/>
+              <a:rPr lang="en-US"/>
               <a:t>Third level</a:t>
             </a:r>
           </a:p>
           <a:p>
             <a:pPr lvl="3"/>
             <a:r>
-              <a:rPr lang="en-US" smtClean="0"/>
+              <a:rPr lang="en-US"/>
               <a:t>Fourth level</a:t>
             </a:r>
           </a:p>
           <a:p>
             <a:pPr lvl="4"/>
             <a:r>
-              <a:rPr lang="en-US" smtClean="0"/>
+              <a:rPr lang="en-US"/>
               <a:t>Fifth level</a:t>
             </a:r>
             <a:endParaRPr lang="en-US" dirty="0"/>
@@ -859,7 +864,7 @@
           <a:p>
             <a:fld id="{B12B632E-5F21-49E3-AE67-6962FA670801}" type="datetimeFigureOut">
               <a:rPr lang="en-US" smtClean="0"/>
-              <a:t>3/8/2018</a:t>
+              <a:t>3/9/2018</a:t>
             </a:fld>
             <a:endParaRPr lang="en-US"/>
           </a:p>
@@ -967,7 +972,7 @@
           </a:lstStyle>
           <a:p>
             <a:r>
-              <a:rPr lang="en-US" smtClean="0"/>
+              <a:rPr lang="en-US"/>
               <a:t>Click to edit Master title style</a:t>
             </a:r>
             <a:endParaRPr lang="en-US" dirty="0"/>
@@ -1090,7 +1095,7 @@
           <a:p>
             <a:pPr lvl="0"/>
             <a:r>
-              <a:rPr lang="en-US" smtClean="0"/>
+              <a:rPr lang="en-US"/>
               <a:t>Click to edit Master text styles</a:t>
             </a:r>
           </a:p>
@@ -1113,7 +1118,7 @@
           <a:p>
             <a:fld id="{B12B632E-5F21-49E3-AE67-6962FA670801}" type="datetimeFigureOut">
               <a:rPr lang="en-US" smtClean="0"/>
-              <a:t>3/8/2018</a:t>
+              <a:t>3/9/2018</a:t>
             </a:fld>
             <a:endParaRPr lang="en-US"/>
           </a:p>
@@ -1245,7 +1250,7 @@
           <a:lstStyle/>
           <a:p>
             <a:r>
-              <a:rPr lang="en-US" smtClean="0"/>
+              <a:rPr lang="en-US"/>
               <a:t>Click to edit Master title style</a:t>
             </a:r>
             <a:endParaRPr lang="en-US" dirty="0"/>
@@ -1302,35 +1307,35 @@
           <a:p>
             <a:pPr lvl="0"/>
             <a:r>
-              <a:rPr lang="en-US" smtClean="0"/>
+              <a:rPr lang="en-US"/>
               <a:t>Click to edit Master text styles</a:t>
             </a:r>
           </a:p>
           <a:p>
             <a:pPr lvl="1"/>
             <a:r>
-              <a:rPr lang="en-US" smtClean="0"/>
+              <a:rPr lang="en-US"/>
               <a:t>Second level</a:t>
             </a:r>
           </a:p>
           <a:p>
             <a:pPr lvl="2"/>
             <a:r>
-              <a:rPr lang="en-US" smtClean="0"/>
+              <a:rPr lang="en-US"/>
               <a:t>Third level</a:t>
             </a:r>
           </a:p>
           <a:p>
             <a:pPr lvl="3"/>
             <a:r>
-              <a:rPr lang="en-US" smtClean="0"/>
+              <a:rPr lang="en-US"/>
               <a:t>Fourth level</a:t>
             </a:r>
           </a:p>
           <a:p>
             <a:pPr lvl="4"/>
             <a:r>
-              <a:rPr lang="en-US" smtClean="0"/>
+              <a:rPr lang="en-US"/>
               <a:t>Fifth level</a:t>
             </a:r>
             <a:endParaRPr lang="en-US" dirty="0"/>
@@ -1387,35 +1392,35 @@
           <a:p>
             <a:pPr lvl="0"/>
             <a:r>
-              <a:rPr lang="en-US" smtClean="0"/>
+              <a:rPr lang="en-US"/>
               <a:t>Click to edit Master text styles</a:t>
             </a:r>
           </a:p>
           <a:p>
             <a:pPr lvl="1"/>
             <a:r>
-              <a:rPr lang="en-US" smtClean="0"/>
+              <a:rPr lang="en-US"/>
               <a:t>Second level</a:t>
             </a:r>
           </a:p>
           <a:p>
             <a:pPr lvl="2"/>
             <a:r>
-              <a:rPr lang="en-US" smtClean="0"/>
+              <a:rPr lang="en-US"/>
               <a:t>Third level</a:t>
             </a:r>
           </a:p>
           <a:p>
             <a:pPr lvl="3"/>
             <a:r>
-              <a:rPr lang="en-US" smtClean="0"/>
+              <a:rPr lang="en-US"/>
               <a:t>Fourth level</a:t>
             </a:r>
           </a:p>
           <a:p>
             <a:pPr lvl="4"/>
             <a:r>
-              <a:rPr lang="en-US" smtClean="0"/>
+              <a:rPr lang="en-US"/>
               <a:t>Fifth level</a:t>
             </a:r>
             <a:endParaRPr lang="en-US" dirty="0"/>
@@ -1439,7 +1444,7 @@
           <a:p>
             <a:fld id="{B12B632E-5F21-49E3-AE67-6962FA670801}" type="datetimeFigureOut">
               <a:rPr lang="en-US" smtClean="0"/>
-              <a:t>3/8/2018</a:t>
+              <a:t>3/9/2018</a:t>
             </a:fld>
             <a:endParaRPr lang="en-US"/>
           </a:p>
@@ -1533,7 +1538,7 @@
           <a:lstStyle/>
           <a:p>
             <a:r>
-              <a:rPr lang="en-US" smtClean="0"/>
+              <a:rPr lang="en-US"/>
               <a:t>Click to edit Master title style</a:t>
             </a:r>
             <a:endParaRPr lang="en-US" dirty="0"/>
@@ -1608,7 +1613,7 @@
           <a:p>
             <a:pPr lvl="0"/>
             <a:r>
-              <a:rPr lang="en-US" smtClean="0"/>
+              <a:rPr lang="en-US"/>
               <a:t>Click to edit Master text styles</a:t>
             </a:r>
           </a:p>
@@ -1664,35 +1669,35 @@
           <a:p>
             <a:pPr lvl="0"/>
             <a:r>
-              <a:rPr lang="en-US" smtClean="0"/>
+              <a:rPr lang="en-US"/>
               <a:t>Click to edit Master text styles</a:t>
             </a:r>
           </a:p>
           <a:p>
             <a:pPr lvl="1"/>
             <a:r>
-              <a:rPr lang="en-US" smtClean="0"/>
+              <a:rPr lang="en-US"/>
               <a:t>Second level</a:t>
             </a:r>
           </a:p>
           <a:p>
             <a:pPr lvl="2"/>
             <a:r>
-              <a:rPr lang="en-US" smtClean="0"/>
+              <a:rPr lang="en-US"/>
               <a:t>Third level</a:t>
             </a:r>
           </a:p>
           <a:p>
             <a:pPr lvl="3"/>
             <a:r>
-              <a:rPr lang="en-US" smtClean="0"/>
+              <a:rPr lang="en-US"/>
               <a:t>Fourth level</a:t>
             </a:r>
           </a:p>
           <a:p>
             <a:pPr lvl="4"/>
             <a:r>
-              <a:rPr lang="en-US" smtClean="0"/>
+              <a:rPr lang="en-US"/>
               <a:t>Fifth level</a:t>
             </a:r>
             <a:endParaRPr lang="en-US" dirty="0"/>
@@ -1782,7 +1787,7 @@
               <a:buNone/>
             </a:pPr>
             <a:r>
-              <a:rPr lang="en-US" smtClean="0"/>
+              <a:rPr lang="en-US"/>
               <a:t>Click to edit Master text styles</a:t>
             </a:r>
           </a:p>
@@ -1838,35 +1843,35 @@
           <a:p>
             <a:pPr lvl="0"/>
             <a:r>
-              <a:rPr lang="en-US" smtClean="0"/>
+              <a:rPr lang="en-US"/>
               <a:t>Click to edit Master text styles</a:t>
             </a:r>
           </a:p>
           <a:p>
             <a:pPr lvl="1"/>
             <a:r>
-              <a:rPr lang="en-US" smtClean="0"/>
+              <a:rPr lang="en-US"/>
               <a:t>Second level</a:t>
             </a:r>
           </a:p>
           <a:p>
             <a:pPr lvl="2"/>
             <a:r>
-              <a:rPr lang="en-US" smtClean="0"/>
+              <a:rPr lang="en-US"/>
               <a:t>Third level</a:t>
             </a:r>
           </a:p>
           <a:p>
             <a:pPr lvl="3"/>
             <a:r>
-              <a:rPr lang="en-US" smtClean="0"/>
+              <a:rPr lang="en-US"/>
               <a:t>Fourth level</a:t>
             </a:r>
           </a:p>
           <a:p>
             <a:pPr lvl="4"/>
             <a:r>
-              <a:rPr lang="en-US" smtClean="0"/>
+              <a:rPr lang="en-US"/>
               <a:t>Fifth level</a:t>
             </a:r>
             <a:endParaRPr lang="en-US" dirty="0"/>
@@ -1890,7 +1895,7 @@
           <a:p>
             <a:fld id="{B12B632E-5F21-49E3-AE67-6962FA670801}" type="datetimeFigureOut">
               <a:rPr lang="en-US" smtClean="0"/>
-              <a:t>3/8/2018</a:t>
+              <a:t>3/9/2018</a:t>
             </a:fld>
             <a:endParaRPr lang="en-US"/>
           </a:p>
@@ -1984,7 +1989,7 @@
           <a:lstStyle/>
           <a:p>
             <a:r>
-              <a:rPr lang="en-US" smtClean="0"/>
+              <a:rPr lang="en-US"/>
               <a:t>Click to edit Master title style</a:t>
             </a:r>
             <a:endParaRPr lang="en-US" dirty="0"/>
@@ -2008,7 +2013,7 @@
           <a:p>
             <a:fld id="{B12B632E-5F21-49E3-AE67-6962FA670801}" type="datetimeFigureOut">
               <a:rPr lang="en-US" smtClean="0"/>
-              <a:t>3/8/2018</a:t>
+              <a:t>3/9/2018</a:t>
             </a:fld>
             <a:endParaRPr lang="en-US"/>
           </a:p>
@@ -2103,7 +2108,7 @@
           <a:p>
             <a:fld id="{B12B632E-5F21-49E3-AE67-6962FA670801}" type="datetimeFigureOut">
               <a:rPr lang="en-US" smtClean="0"/>
-              <a:t>3/8/2018</a:t>
+              <a:t>3/9/2018</a:t>
             </a:fld>
             <a:endParaRPr lang="en-US"/>
           </a:p>
@@ -2208,7 +2213,7 @@
           </a:lstStyle>
           <a:p>
             <a:r>
-              <a:rPr lang="en-US" smtClean="0"/>
+              <a:rPr lang="en-US"/>
               <a:t>Click to edit Master title style</a:t>
             </a:r>
             <a:endParaRPr lang="en-US" dirty="0"/>
@@ -2265,35 +2270,35 @@
           <a:p>
             <a:pPr lvl="0"/>
             <a:r>
-              <a:rPr lang="en-US" smtClean="0"/>
+              <a:rPr lang="en-US"/>
               <a:t>Click to edit Master text styles</a:t>
             </a:r>
           </a:p>
           <a:p>
             <a:pPr lvl="1"/>
             <a:r>
-              <a:rPr lang="en-US" smtClean="0"/>
+              <a:rPr lang="en-US"/>
               <a:t>Second level</a:t>
             </a:r>
           </a:p>
           <a:p>
             <a:pPr lvl="2"/>
             <a:r>
-              <a:rPr lang="en-US" smtClean="0"/>
+              <a:rPr lang="en-US"/>
               <a:t>Third level</a:t>
             </a:r>
           </a:p>
           <a:p>
             <a:pPr lvl="3"/>
             <a:r>
-              <a:rPr lang="en-US" smtClean="0"/>
+              <a:rPr lang="en-US"/>
               <a:t>Fourth level</a:t>
             </a:r>
           </a:p>
           <a:p>
             <a:pPr lvl="4"/>
             <a:r>
-              <a:rPr lang="en-US" smtClean="0"/>
+              <a:rPr lang="en-US"/>
               <a:t>Fifth level</a:t>
             </a:r>
             <a:endParaRPr lang="en-US" dirty="0"/>
@@ -2367,7 +2372,7 @@
           <a:p>
             <a:pPr lvl="0"/>
             <a:r>
-              <a:rPr lang="en-US" smtClean="0"/>
+              <a:rPr lang="en-US"/>
               <a:t>Click to edit Master text styles</a:t>
             </a:r>
           </a:p>
@@ -2390,7 +2395,7 @@
           <a:p>
             <a:fld id="{B12B632E-5F21-49E3-AE67-6962FA670801}" type="datetimeFigureOut">
               <a:rPr lang="en-US" smtClean="0"/>
-              <a:t>3/8/2018</a:t>
+              <a:t>3/9/2018</a:t>
             </a:fld>
             <a:endParaRPr lang="en-US"/>
           </a:p>
@@ -2537,7 +2542,7 @@
           </a:lstStyle>
           <a:p>
             <a:r>
-              <a:rPr lang="en-US" smtClean="0"/>
+              <a:rPr lang="en-US"/>
               <a:t>Click to edit Master title style</a:t>
             </a:r>
             <a:endParaRPr lang="en-US" dirty="0"/>
@@ -2609,7 +2614,7 @@
           </a:lstStyle>
           <a:p>
             <a:r>
-              <a:rPr lang="en-US" smtClean="0"/>
+              <a:rPr lang="en-US"/>
               <a:t>Click icon to add picture</a:t>
             </a:r>
             <a:endParaRPr lang="en-US" dirty="0"/>
@@ -2689,7 +2694,7 @@
           <a:p>
             <a:pPr lvl="0"/>
             <a:r>
-              <a:rPr lang="en-US" smtClean="0"/>
+              <a:rPr lang="en-US"/>
               <a:t>Click to edit Master text styles</a:t>
             </a:r>
           </a:p>
@@ -2712,7 +2717,7 @@
           <a:p>
             <a:fld id="{B12B632E-5F21-49E3-AE67-6962FA670801}" type="datetimeFigureOut">
               <a:rPr lang="en-US" smtClean="0"/>
-              <a:t>3/8/2018</a:t>
+              <a:t>3/9/2018</a:t>
             </a:fld>
             <a:endParaRPr lang="en-US"/>
           </a:p>
@@ -2861,7 +2866,7 @@
           <a:lstStyle/>
           <a:p>
             <a:r>
-              <a:rPr lang="en-US" smtClean="0"/>
+              <a:rPr lang="en-US"/>
               <a:t>Click to edit Master title style</a:t>
             </a:r>
             <a:endParaRPr lang="en-US" dirty="0"/>
@@ -2895,35 +2900,35 @@
           <a:p>
             <a:pPr lvl="0"/>
             <a:r>
-              <a:rPr lang="en-US" smtClean="0"/>
+              <a:rPr lang="en-US"/>
               <a:t>Click to edit Master text styles</a:t>
             </a:r>
           </a:p>
           <a:p>
             <a:pPr lvl="1"/>
             <a:r>
-              <a:rPr lang="en-US" smtClean="0"/>
+              <a:rPr lang="en-US"/>
               <a:t>Second level</a:t>
             </a:r>
           </a:p>
           <a:p>
             <a:pPr lvl="2"/>
             <a:r>
-              <a:rPr lang="en-US" smtClean="0"/>
+              <a:rPr lang="en-US"/>
               <a:t>Third level</a:t>
             </a:r>
           </a:p>
           <a:p>
             <a:pPr lvl="3"/>
             <a:r>
-              <a:rPr lang="en-US" smtClean="0"/>
+              <a:rPr lang="en-US"/>
               <a:t>Fourth level</a:t>
             </a:r>
           </a:p>
           <a:p>
             <a:pPr lvl="4"/>
             <a:r>
-              <a:rPr lang="en-US" smtClean="0"/>
+              <a:rPr lang="en-US"/>
               <a:t>Fifth level</a:t>
             </a:r>
             <a:endParaRPr lang="en-US" dirty="0"/>
@@ -2966,7 +2971,7 @@
           <a:p>
             <a:fld id="{B12B632E-5F21-49E3-AE67-6962FA670801}" type="datetimeFigureOut">
               <a:rPr lang="en-US" smtClean="0"/>
-              <a:t>3/8/2018</a:t>
+              <a:t>3/9/2018</a:t>
             </a:fld>
             <a:endParaRPr lang="en-US"/>
           </a:p>
@@ -3470,10 +3475,9 @@
           <a:lstStyle/>
           <a:p>
             <a:r>
-              <a:rPr lang="en-US" dirty="0" smtClean="0"/>
+              <a:rPr lang="en-US" dirty="0"/>
               <a:t>Modeling the Anharmonic Oscillator</a:t>
             </a:r>
-            <a:endParaRPr lang="en-US" dirty="0"/>
           </a:p>
         </p:txBody>
       </p:sp>
@@ -3495,22 +3499,21 @@
           <a:lstStyle/>
           <a:p>
             <a:r>
-              <a:rPr lang="en-US" dirty="0" smtClean="0"/>
+              <a:rPr lang="en-US" dirty="0"/>
               <a:t>Adrian Martin</a:t>
             </a:r>
           </a:p>
           <a:p>
             <a:r>
-              <a:rPr lang="en-US" dirty="0" smtClean="0"/>
+              <a:rPr lang="en-US" dirty="0"/>
               <a:t>Computational Physics</a:t>
             </a:r>
           </a:p>
           <a:p>
             <a:r>
-              <a:rPr lang="en-US" dirty="0" smtClean="0"/>
+              <a:rPr lang="en-US" dirty="0"/>
               <a:t>March 9, 2018</a:t>
             </a:r>
-            <a:endParaRPr lang="en-US" dirty="0"/>
           </a:p>
         </p:txBody>
       </p:sp>
@@ -3524,13 +3527,6 @@
   <p:clrMapOvr>
     <a:masterClrMapping/>
   </p:clrMapOvr>
-  <p:timing>
-    <p:tnLst>
-      <p:par>
-        <p:cTn id="1" dur="indefinite" restart="never" nodeType="tmRoot"/>
-      </p:par>
-    </p:tnLst>
-  </p:timing>
 </p:sld>
 </file>
 
@@ -3574,10 +3570,9 @@
           <a:lstStyle/>
           <a:p>
             <a:r>
-              <a:rPr lang="en-US" sz="3600" dirty="0" smtClean="0"/>
+              <a:rPr lang="en-US" sz="3600" dirty="0"/>
               <a:t>Anharmonic vs Harmonic Oscillators</a:t>
             </a:r>
-            <a:endParaRPr lang="en-US" sz="3600" dirty="0"/>
           </a:p>
         </p:txBody>
       </p:sp>
@@ -3602,23 +3597,31 @@
           <a:lstStyle/>
           <a:p>
             <a:r>
-              <a:rPr lang="en-US" sz="2000" dirty="0" smtClean="0"/>
-              <a:t>Harmonic oscillators have potential function V(x) = x</a:t>
-            </a:r>
-            <a:r>
-              <a:rPr lang="en-US" sz="2000" baseline="30000" dirty="0" smtClean="0"/>
+              <a:rPr lang="en-US" sz="2000" dirty="0"/>
+              <a:t>Harmonic oscillators have potential V(x) </a:t>
+            </a:r>
+            <a:r>
+              <a:rPr lang="el-GR" sz="2000" dirty="0"/>
+              <a:t></a:t>
+            </a:r>
+            <a:r>
+              <a:rPr lang="en-US" sz="2000" dirty="0"/>
+              <a:t> x</a:t>
+            </a:r>
+            <a:r>
+              <a:rPr lang="en-US" sz="2000" baseline="30000" dirty="0"/>
               <a:t>2</a:t>
             </a:r>
           </a:p>
           <a:p>
             <a:r>
-              <a:rPr lang="en-US" sz="2000" dirty="0" smtClean="0"/>
+              <a:rPr lang="en-US" sz="2000" dirty="0"/>
               <a:t>Period does not vary based on amplitude</a:t>
             </a:r>
           </a:p>
           <a:p>
             <a:r>
-              <a:rPr lang="en-US" sz="2000" dirty="0" smtClean="0"/>
+              <a:rPr lang="en-US" sz="2000" dirty="0"/>
               <a:t>Some systems are approximately harmonic under certain conditions</a:t>
             </a:r>
           </a:p>
@@ -3648,39 +3651,35 @@
           <a:lstStyle/>
           <a:p>
             <a:r>
-              <a:rPr lang="en-US" sz="2000" dirty="0" smtClean="0"/>
-              <a:t>Anharmonic oscillators can have any potential function besides </a:t>
-            </a:r>
-            <a:r>
-              <a:rPr lang="en-US" sz="2000" dirty="0" smtClean="0"/>
-              <a:t>V(x) = x</a:t>
-            </a:r>
-            <a:r>
-              <a:rPr lang="en-US" sz="2000" baseline="30000" dirty="0" smtClean="0"/>
+              <a:rPr lang="en-US" sz="2000" dirty="0"/>
+              <a:t>Anharmonic oscillators can have any potential function besides V(x)  x</a:t>
+            </a:r>
+            <a:r>
+              <a:rPr lang="en-US" sz="2000" baseline="30000" dirty="0"/>
               <a:t>2</a:t>
             </a:r>
             <a:r>
-              <a:rPr lang="en-US" sz="2000" dirty="0" smtClean="0"/>
-              <a:t> e.g. V(x) = x</a:t>
-            </a:r>
-            <a:r>
-              <a:rPr lang="en-US" sz="2000" baseline="30000" dirty="0" smtClean="0"/>
+              <a:rPr lang="en-US" sz="2000" dirty="0"/>
+              <a:t> e.g. V(x)  x</a:t>
+            </a:r>
+            <a:r>
+              <a:rPr lang="en-US" sz="2000" baseline="30000" dirty="0"/>
               <a:t>4</a:t>
             </a:r>
           </a:p>
           <a:p>
             <a:r>
-              <a:rPr lang="en-US" sz="2000" dirty="0" smtClean="0"/>
+              <a:rPr lang="en-US" sz="2000" dirty="0"/>
               <a:t>Period depends on amplitude</a:t>
             </a:r>
           </a:p>
           <a:p>
             <a:r>
-              <a:rPr lang="en-US" sz="2000" dirty="0" smtClean="0"/>
+              <a:rPr lang="en-US" sz="2000" dirty="0"/>
               <a:t>Most natural systems are </a:t>
             </a:r>
             <a:r>
-              <a:rPr lang="en-US" sz="2000" dirty="0" err="1" smtClean="0"/>
+              <a:rPr lang="en-US" sz="2000" dirty="0" err="1"/>
               <a:t>anharmonic</a:t>
             </a:r>
             <a:endParaRPr lang="en-US" sz="2000" dirty="0"/>
@@ -3768,13 +3767,6 @@
   <p:clrMapOvr>
     <a:masterClrMapping/>
   </p:clrMapOvr>
-  <p:timing>
-    <p:tnLst>
-      <p:par>
-        <p:cTn id="1" dur="indefinite" restart="never" nodeType="tmRoot"/>
-      </p:par>
-    </p:tnLst>
-  </p:timing>
 </p:sld>
 </file>
 
@@ -3818,10 +3810,9 @@
           <a:lstStyle/>
           <a:p>
             <a:r>
-              <a:rPr lang="en-US" sz="3600" dirty="0" smtClean="0"/>
+              <a:rPr lang="en-US" sz="3600" dirty="0"/>
               <a:t>Modeling Period vs Amplitude</a:t>
             </a:r>
-            <a:endParaRPr lang="en-US" sz="3600" dirty="0"/>
           </a:p>
         </p:txBody>
       </p:sp>
@@ -3848,7 +3839,7 @@
           <a:lstStyle/>
           <a:p>
             <a:r>
-              <a:rPr lang="en-US" sz="2800" dirty="0" smtClean="0"/>
+              <a:rPr lang="en-US" sz="2800" dirty="0"/>
               <a:t>Equation that relates period and amplitude:</a:t>
             </a:r>
           </a:p>
@@ -3856,20 +3847,19 @@
             <a:endParaRPr lang="en-US" sz="2800" dirty="0"/>
           </a:p>
           <a:p>
-            <a:endParaRPr lang="en-US" sz="2800" dirty="0" smtClean="0"/>
-          </a:p>
-          <a:p>
-            <a:r>
-              <a:rPr lang="en-US" sz="2800" dirty="0" smtClean="0"/>
+            <a:endParaRPr lang="en-US" sz="2800" dirty="0"/>
+          </a:p>
+          <a:p>
+            <a:r>
+              <a:rPr lang="en-US" sz="2800" dirty="0"/>
               <a:t>Used Romberg integration in code</a:t>
             </a:r>
           </a:p>
           <a:p>
             <a:r>
-              <a:rPr lang="en-US" sz="2800" dirty="0" smtClean="0"/>
+              <a:rPr lang="en-US" sz="2800" dirty="0"/>
               <a:t>Derived from:</a:t>
             </a:r>
-            <a:endParaRPr lang="en-US" sz="2800" dirty="0"/>
           </a:p>
         </p:txBody>
       </p:sp>
@@ -3929,13 +3919,6 @@
   <p:clrMapOvr>
     <a:masterClrMapping/>
   </p:clrMapOvr>
-  <p:timing>
-    <p:tnLst>
-      <p:par>
-        <p:cTn id="1" dur="indefinite" restart="never" nodeType="tmRoot"/>
-      </p:par>
-    </p:tnLst>
-  </p:timing>
 </p:sld>
 </file>
 
@@ -3979,23 +3962,19 @@
           <a:lstStyle/>
           <a:p>
             <a:r>
-              <a:rPr lang="en-US" dirty="0" smtClean="0"/>
+              <a:rPr lang="en-US" dirty="0"/>
               <a:t>Oscillators with potential functions V(x) = </a:t>
             </a:r>
             <a:r>
-              <a:rPr lang="en-US" dirty="0" err="1" smtClean="0"/>
+              <a:rPr lang="en-US" dirty="0" err="1"/>
               <a:t>x</a:t>
             </a:r>
             <a:r>
-              <a:rPr lang="en-US" baseline="30000" dirty="0" err="1" smtClean="0"/>
+              <a:rPr lang="en-US" baseline="30000" dirty="0" err="1"/>
               <a:t>n</a:t>
             </a:r>
-            <a:r>
-              <a:rPr lang="en-US" baseline="30000" dirty="0" smtClean="0"/>
-              <a:t/>
-            </a:r>
             <a:br>
-              <a:rPr lang="en-US" baseline="30000" dirty="0" smtClean="0"/>
+              <a:rPr lang="en-US" baseline="30000" dirty="0"/>
             </a:br>
             <a:endParaRPr lang="en-US" dirty="0"/>
           </a:p>
@@ -4034,13 +4013,6 @@
   <p:clrMapOvr>
     <a:masterClrMapping/>
   </p:clrMapOvr>
-  <p:timing>
-    <p:tnLst>
-      <p:par>
-        <p:cTn id="1" dur="indefinite" restart="never" nodeType="tmRoot"/>
-      </p:par>
-    </p:tnLst>
-  </p:timing>
 </p:sld>
 </file>
 
@@ -4084,10 +4056,9 @@
           <a:lstStyle/>
           <a:p>
             <a:r>
-              <a:rPr lang="en-US" sz="3600" dirty="0" smtClean="0"/>
+              <a:rPr lang="en-US" sz="3600" dirty="0"/>
               <a:t>The Pendulum</a:t>
             </a:r>
-            <a:endParaRPr lang="en-US" sz="3600" dirty="0"/>
           </a:p>
         </p:txBody>
       </p:sp>
@@ -4114,36 +4085,36 @@
           <a:lstStyle/>
           <a:p>
             <a:r>
-              <a:rPr lang="en-US" sz="2600" dirty="0" smtClean="0"/>
+              <a:rPr lang="en-US" sz="2600" dirty="0"/>
               <a:t>A pendulum swinging at large amplitudes is an example of an </a:t>
             </a:r>
             <a:r>
-              <a:rPr lang="en-US" sz="2600" dirty="0" err="1" smtClean="0"/>
+              <a:rPr lang="en-US" sz="2600" dirty="0" err="1"/>
               <a:t>anharmonic</a:t>
             </a:r>
             <a:r>
-              <a:rPr lang="en-US" sz="2600" dirty="0" smtClean="0"/>
+              <a:rPr lang="en-US" sz="2600" dirty="0"/>
               <a:t> oscillator</a:t>
             </a:r>
           </a:p>
           <a:p>
-            <a:endParaRPr lang="en-US" sz="2600" dirty="0" smtClean="0"/>
-          </a:p>
-          <a:p>
-            <a:endParaRPr lang="en-US" sz="2600" dirty="0" smtClean="0"/>
-          </a:p>
-          <a:p>
-            <a:endParaRPr lang="en-US" sz="2600" dirty="0" smtClean="0"/>
+            <a:endParaRPr lang="en-US" sz="2600" dirty="0"/>
+          </a:p>
+          <a:p>
+            <a:endParaRPr lang="en-US" sz="2600" dirty="0"/>
+          </a:p>
+          <a:p>
+            <a:endParaRPr lang="en-US" sz="2600" dirty="0"/>
           </a:p>
           <a:p>
             <a:pPr marL="0" indent="0">
               <a:buNone/>
             </a:pPr>
-            <a:endParaRPr lang="en-US" sz="2600" dirty="0" smtClean="0"/>
-          </a:p>
-          <a:p>
-            <a:r>
-              <a:rPr lang="en-US" sz="2600" dirty="0" smtClean="0"/>
+            <a:endParaRPr lang="en-US" sz="2600" dirty="0"/>
+          </a:p>
+          <a:p>
+            <a:r>
+              <a:rPr lang="en-US" sz="2600" dirty="0"/>
               <a:t>Boundary conditions: </a:t>
             </a:r>
           </a:p>
@@ -4496,16 +4467,10 @@
               <a:rPr lang="en-US" sz="1600" u="sng" dirty="0">
                 <a:hlinkClick r:id="rId5"/>
               </a:rPr>
-              <a:t>https://</a:t>
-            </a:r>
-            <a:r>
-              <a:rPr lang="en-US" sz="1600" u="sng" dirty="0" smtClean="0">
-                <a:hlinkClick r:id="rId5"/>
-              </a:rPr>
-              <a:t>www.youtube.com/watch?v=U30vnuplsnU</a:t>
-            </a:r>
-            <a:r>
-              <a:rPr lang="en-US" sz="1600" u="sng" dirty="0" smtClean="0"/>
+              <a:t>https://www.youtube.com/watch?v=U30vnuplsnU</a:t>
+            </a:r>
+            <a:r>
+              <a:rPr lang="en-US" sz="1600" u="sng" dirty="0"/>
               <a:t> </a:t>
             </a:r>
             <a:endParaRPr lang="en-US" sz="1600" dirty="0"/>
@@ -4522,13 +4487,6 @@
   <p:clrMapOvr>
     <a:masterClrMapping/>
   </p:clrMapOvr>
-  <p:timing>
-    <p:tnLst>
-      <p:par>
-        <p:cTn id="1" dur="indefinite" restart="never" nodeType="tmRoot"/>
-      </p:par>
-    </p:tnLst>
-  </p:timing>
 </p:sld>
 </file>
 
@@ -4572,10 +4530,9 @@
           <a:lstStyle/>
           <a:p>
             <a:r>
-              <a:rPr lang="en-US" sz="3600" dirty="0" smtClean="0"/>
+              <a:rPr lang="en-US" sz="3600" dirty="0"/>
               <a:t>Modeling Pendulum Motion</a:t>
             </a:r>
-            <a:endParaRPr lang="en-US" sz="3600" dirty="0"/>
           </a:p>
         </p:txBody>
       </p:sp>
@@ -4630,13 +4587,13 @@
               <a:buChar char="•"/>
             </a:pPr>
             <a:r>
-              <a:rPr lang="en-US" sz="2400" dirty="0" smtClean="0"/>
+              <a:rPr lang="en-US" sz="2400" dirty="0"/>
               <a:t>Pendulum potential function:</a:t>
             </a:r>
           </a:p>
           <a:p>
             <a:r>
-              <a:rPr lang="en-US" sz="2400" dirty="0" smtClean="0"/>
+              <a:rPr lang="en-US" sz="2400" dirty="0"/>
               <a:t>	V(x) = 1 – cos(x)</a:t>
             </a:r>
           </a:p>
@@ -4646,26 +4603,22 @@
               <a:buChar char="•"/>
             </a:pPr>
             <a:r>
-              <a:rPr lang="en-US" sz="2400" dirty="0" smtClean="0"/>
+              <a:rPr lang="en-US" sz="2400" dirty="0"/>
               <a:t>Harmonic Potential Function:</a:t>
             </a:r>
           </a:p>
           <a:p>
             <a:r>
-              <a:rPr lang="en-US" sz="2400" dirty="0" smtClean="0"/>
-              <a:t>	</a:t>
-            </a:r>
-            <a:r>
-              <a:rPr lang="en-US" sz="2400" dirty="0" smtClean="0"/>
-              <a:t>V(x) = x</a:t>
-            </a:r>
-            <a:r>
-              <a:rPr lang="en-US" sz="2400" baseline="30000" dirty="0" smtClean="0"/>
+              <a:rPr lang="en-US" sz="2400" dirty="0"/>
+              <a:t>	V(x) = x</a:t>
+            </a:r>
+            <a:r>
+              <a:rPr lang="en-US" sz="2400" baseline="30000" dirty="0"/>
               <a:t>2</a:t>
             </a:r>
           </a:p>
           <a:p>
-            <a:endParaRPr lang="en-US" sz="2400" dirty="0" smtClean="0"/>
+            <a:endParaRPr lang="en-US" sz="2400" dirty="0"/>
           </a:p>
           <a:p>
             <a:pPr marL="285750" indent="-285750">
@@ -4673,21 +4626,21 @@
               <a:buChar char="•"/>
             </a:pPr>
             <a:r>
-              <a:rPr lang="en-US" sz="2400" dirty="0" smtClean="0"/>
+              <a:rPr lang="en-US" sz="2400" dirty="0"/>
               <a:t>By the small angle approximation, </a:t>
             </a:r>
           </a:p>
           <a:p>
             <a:r>
-              <a:rPr lang="en-US" sz="2400" dirty="0" smtClean="0"/>
+              <a:rPr lang="en-US" sz="2400" dirty="0"/>
               <a:t>cos(x) ≈ 1 +  x</a:t>
             </a:r>
             <a:r>
-              <a:rPr lang="en-US" sz="2400" baseline="30000" dirty="0" smtClean="0"/>
+              <a:rPr lang="en-US" sz="2400" baseline="30000" dirty="0"/>
               <a:t>2 </a:t>
             </a:r>
             <a:r>
-              <a:rPr lang="en-US" sz="2400" dirty="0" smtClean="0"/>
+              <a:rPr lang="en-US" sz="2400" dirty="0"/>
               <a:t>at small angles</a:t>
             </a:r>
           </a:p>
@@ -4703,13 +4656,6 @@
   <p:clrMapOvr>
     <a:masterClrMapping/>
   </p:clrMapOvr>
-  <p:timing>
-    <p:tnLst>
-      <p:par>
-        <p:cTn id="1" dur="indefinite" restart="never" nodeType="tmRoot"/>
-      </p:par>
-    </p:tnLst>
-  </p:timing>
 </p:sld>
 </file>
 
@@ -4748,10 +4694,9 @@
           <a:lstStyle/>
           <a:p>
             <a:r>
-              <a:rPr lang="en-US" sz="3600" dirty="0" smtClean="0"/>
+              <a:rPr lang="en-US" sz="3600" dirty="0"/>
               <a:t>Sources</a:t>
             </a:r>
-            <a:endParaRPr lang="en-US" sz="3600" dirty="0"/>
           </a:p>
         </p:txBody>
       </p:sp>
@@ -4827,13 +4772,6 @@
   <p:clrMapOvr>
     <a:masterClrMapping/>
   </p:clrMapOvr>
-  <p:timing>
-    <p:tnLst>
-      <p:par>
-        <p:cTn id="1" dur="indefinite" restart="never" nodeType="tmRoot"/>
-      </p:par>
-    </p:tnLst>
-  </p:timing>
 </p:sld>
 </file>
 

</xml_diff>